<commit_message>
updated with space station
</commit_message>
<xml_diff>
--- a/wikiimages/rockets.pptx
+++ b/wikiimages/rockets.pptx
@@ -7,6 +7,7 @@
   <p:sldIdLst>
     <p:sldId id="256" r:id="rId2"/>
     <p:sldId id="257" r:id="rId3"/>
+    <p:sldId id="258" r:id="rId4"/>
   </p:sldIdLst>
   <p:sldSz cx="9144000" cy="6858000" type="screen4x3"/>
   <p:notesSz cx="6858000" cy="9144000"/>
@@ -289,7 +290,7 @@
           <a:p>
             <a:fld id="{76948337-F7AC-4FBF-8433-45C75EF7F95F}" type="datetimeFigureOut">
               <a:rPr lang="en-US" smtClean="0"/>
-              <a:t>1/30/2016</a:t>
+              <a:t>2/20/2016</a:t>
             </a:fld>
             <a:endParaRPr lang="en-US"/>
           </a:p>
@@ -459,7 +460,7 @@
           <a:p>
             <a:fld id="{76948337-F7AC-4FBF-8433-45C75EF7F95F}" type="datetimeFigureOut">
               <a:rPr lang="en-US" smtClean="0"/>
-              <a:t>1/30/2016</a:t>
+              <a:t>2/20/2016</a:t>
             </a:fld>
             <a:endParaRPr lang="en-US"/>
           </a:p>
@@ -639,7 +640,7 @@
           <a:p>
             <a:fld id="{76948337-F7AC-4FBF-8433-45C75EF7F95F}" type="datetimeFigureOut">
               <a:rPr lang="en-US" smtClean="0"/>
-              <a:t>1/30/2016</a:t>
+              <a:t>2/20/2016</a:t>
             </a:fld>
             <a:endParaRPr lang="en-US"/>
           </a:p>
@@ -809,7 +810,7 @@
           <a:p>
             <a:fld id="{76948337-F7AC-4FBF-8433-45C75EF7F95F}" type="datetimeFigureOut">
               <a:rPr lang="en-US" smtClean="0"/>
-              <a:t>1/30/2016</a:t>
+              <a:t>2/20/2016</a:t>
             </a:fld>
             <a:endParaRPr lang="en-US"/>
           </a:p>
@@ -1055,7 +1056,7 @@
           <a:p>
             <a:fld id="{76948337-F7AC-4FBF-8433-45C75EF7F95F}" type="datetimeFigureOut">
               <a:rPr lang="en-US" smtClean="0"/>
-              <a:t>1/30/2016</a:t>
+              <a:t>2/20/2016</a:t>
             </a:fld>
             <a:endParaRPr lang="en-US"/>
           </a:p>
@@ -1343,7 +1344,7 @@
           <a:p>
             <a:fld id="{76948337-F7AC-4FBF-8433-45C75EF7F95F}" type="datetimeFigureOut">
               <a:rPr lang="en-US" smtClean="0"/>
-              <a:t>1/30/2016</a:t>
+              <a:t>2/20/2016</a:t>
             </a:fld>
             <a:endParaRPr lang="en-US"/>
           </a:p>
@@ -1765,7 +1766,7 @@
           <a:p>
             <a:fld id="{76948337-F7AC-4FBF-8433-45C75EF7F95F}" type="datetimeFigureOut">
               <a:rPr lang="en-US" smtClean="0"/>
-              <a:t>1/30/2016</a:t>
+              <a:t>2/20/2016</a:t>
             </a:fld>
             <a:endParaRPr lang="en-US"/>
           </a:p>
@@ -1883,7 +1884,7 @@
           <a:p>
             <a:fld id="{76948337-F7AC-4FBF-8433-45C75EF7F95F}" type="datetimeFigureOut">
               <a:rPr lang="en-US" smtClean="0"/>
-              <a:t>1/30/2016</a:t>
+              <a:t>2/20/2016</a:t>
             </a:fld>
             <a:endParaRPr lang="en-US"/>
           </a:p>
@@ -1978,7 +1979,7 @@
           <a:p>
             <a:fld id="{76948337-F7AC-4FBF-8433-45C75EF7F95F}" type="datetimeFigureOut">
               <a:rPr lang="en-US" smtClean="0"/>
-              <a:t>1/30/2016</a:t>
+              <a:t>2/20/2016</a:t>
             </a:fld>
             <a:endParaRPr lang="en-US"/>
           </a:p>
@@ -2255,7 +2256,7 @@
           <a:p>
             <a:fld id="{76948337-F7AC-4FBF-8433-45C75EF7F95F}" type="datetimeFigureOut">
               <a:rPr lang="en-US" smtClean="0"/>
-              <a:t>1/30/2016</a:t>
+              <a:t>2/20/2016</a:t>
             </a:fld>
             <a:endParaRPr lang="en-US"/>
           </a:p>
@@ -2508,7 +2509,7 @@
           <a:p>
             <a:fld id="{76948337-F7AC-4FBF-8433-45C75EF7F95F}" type="datetimeFigureOut">
               <a:rPr lang="en-US" smtClean="0"/>
-              <a:t>1/30/2016</a:t>
+              <a:t>2/20/2016</a:t>
             </a:fld>
             <a:endParaRPr lang="en-US"/>
           </a:p>
@@ -2721,7 +2722,7 @@
           <a:p>
             <a:fld id="{76948337-F7AC-4FBF-8433-45C75EF7F95F}" type="datetimeFigureOut">
               <a:rPr lang="en-US" smtClean="0"/>
-              <a:t>1/30/2016</a:t>
+              <a:t>2/20/2016</a:t>
             </a:fld>
             <a:endParaRPr lang="en-US"/>
           </a:p>
@@ -3768,6 +3769,186 @@
     <p:extLst>
       <p:ext uri="{BB962C8B-B14F-4D97-AF65-F5344CB8AC3E}">
         <p14:creationId xmlns:p14="http://schemas.microsoft.com/office/powerpoint/2010/main" val="1928165710"/>
+      </p:ext>
+    </p:extLst>
+  </p:cSld>
+  <p:clrMapOvr>
+    <a:masterClrMapping/>
+  </p:clrMapOvr>
+</p:sld>
+</file>
+
+<file path=ppt/slides/slide3.xml><?xml version="1.0" encoding="utf-8"?>
+<p:sld xmlns:a="http://schemas.openxmlformats.org/drawingml/2006/main" xmlns:r="http://schemas.openxmlformats.org/officeDocument/2006/relationships" xmlns:p="http://schemas.openxmlformats.org/presentationml/2006/main">
+  <p:cSld>
+    <p:spTree>
+      <p:nvGrpSpPr>
+        <p:cNvPr id="1" name=""/>
+        <p:cNvGrpSpPr/>
+        <p:nvPr/>
+      </p:nvGrpSpPr>
+      <p:grpSpPr>
+        <a:xfrm>
+          <a:off x="0" y="0"/>
+          <a:ext cx="0" cy="0"/>
+          <a:chOff x="0" y="0"/>
+          <a:chExt cx="0" cy="0"/>
+        </a:xfrm>
+      </p:grpSpPr>
+      <p:pic>
+        <p:nvPicPr>
+          <p:cNvPr id="4" name="Picture 3"/>
+          <p:cNvPicPr>
+            <a:picLocks noChangeAspect="1"/>
+          </p:cNvPicPr>
+          <p:nvPr/>
+        </p:nvPicPr>
+        <p:blipFill>
+          <a:blip r:embed="rId2">
+            <a:extLst>
+              <a:ext uri="{28A0092B-C50C-407E-A947-70E740481C1C}">
+                <a14:useLocalDpi xmlns:a14="http://schemas.microsoft.com/office/drawing/2010/main" val="0"/>
+              </a:ext>
+            </a:extLst>
+          </a:blip>
+          <a:stretch>
+            <a:fillRect/>
+          </a:stretch>
+        </p:blipFill>
+        <p:spPr>
+          <a:xfrm>
+            <a:off x="3962400" y="249228"/>
+            <a:ext cx="1625397" cy="1625397"/>
+          </a:xfrm>
+          <a:prstGeom prst="rect">
+            <a:avLst/>
+          </a:prstGeom>
+        </p:spPr>
+      </p:pic>
+      <p:pic>
+        <p:nvPicPr>
+          <p:cNvPr id="6" name="Picture 5"/>
+          <p:cNvPicPr>
+            <a:picLocks noChangeAspect="1"/>
+          </p:cNvPicPr>
+          <p:nvPr/>
+        </p:nvPicPr>
+        <p:blipFill>
+          <a:blip r:embed="rId3">
+            <a:extLst>
+              <a:ext uri="{28A0092B-C50C-407E-A947-70E740481C1C}">
+                <a14:useLocalDpi xmlns:a14="http://schemas.microsoft.com/office/drawing/2010/main" val="0"/>
+              </a:ext>
+            </a:extLst>
+          </a:blip>
+          <a:stretch>
+            <a:fillRect/>
+          </a:stretch>
+        </p:blipFill>
+        <p:spPr>
+          <a:xfrm>
+            <a:off x="2505303" y="249228"/>
+            <a:ext cx="1625397" cy="1625397"/>
+          </a:xfrm>
+          <a:prstGeom prst="rect">
+            <a:avLst/>
+          </a:prstGeom>
+        </p:spPr>
+      </p:pic>
+      <p:pic>
+        <p:nvPicPr>
+          <p:cNvPr id="7" name="Picture 6"/>
+          <p:cNvPicPr>
+            <a:picLocks noChangeAspect="1"/>
+          </p:cNvPicPr>
+          <p:nvPr/>
+        </p:nvPicPr>
+        <p:blipFill>
+          <a:blip r:embed="rId4">
+            <a:extLst>
+              <a:ext uri="{28A0092B-C50C-407E-A947-70E740481C1C}">
+                <a14:useLocalDpi xmlns:a14="http://schemas.microsoft.com/office/drawing/2010/main" val="0"/>
+              </a:ext>
+            </a:extLst>
+          </a:blip>
+          <a:stretch>
+            <a:fillRect/>
+          </a:stretch>
+        </p:blipFill>
+        <p:spPr>
+          <a:xfrm>
+            <a:off x="762000" y="249228"/>
+            <a:ext cx="1625397" cy="1625397"/>
+          </a:xfrm>
+          <a:prstGeom prst="rect">
+            <a:avLst/>
+          </a:prstGeom>
+        </p:spPr>
+      </p:pic>
+      <p:pic>
+        <p:nvPicPr>
+          <p:cNvPr id="8" name="Picture 7"/>
+          <p:cNvPicPr>
+            <a:picLocks noChangeAspect="1"/>
+          </p:cNvPicPr>
+          <p:nvPr/>
+        </p:nvPicPr>
+        <p:blipFill>
+          <a:blip r:embed="rId5">
+            <a:extLst>
+              <a:ext uri="{28A0092B-C50C-407E-A947-70E740481C1C}">
+                <a14:useLocalDpi xmlns:a14="http://schemas.microsoft.com/office/drawing/2010/main" val="0"/>
+              </a:ext>
+            </a:extLst>
+          </a:blip>
+          <a:stretch>
+            <a:fillRect/>
+          </a:stretch>
+        </p:blipFill>
+        <p:spPr>
+          <a:xfrm>
+            <a:off x="5384698" y="249228"/>
+            <a:ext cx="1625397" cy="1625397"/>
+          </a:xfrm>
+          <a:prstGeom prst="rect">
+            <a:avLst/>
+          </a:prstGeom>
+        </p:spPr>
+      </p:pic>
+      <p:pic>
+        <p:nvPicPr>
+          <p:cNvPr id="9" name="Picture 8"/>
+          <p:cNvPicPr>
+            <a:picLocks noChangeAspect="1"/>
+          </p:cNvPicPr>
+          <p:nvPr/>
+        </p:nvPicPr>
+        <p:blipFill>
+          <a:blip r:embed="rId6">
+            <a:extLst>
+              <a:ext uri="{28A0092B-C50C-407E-A947-70E740481C1C}">
+                <a14:useLocalDpi xmlns:a14="http://schemas.microsoft.com/office/drawing/2010/main" val="0"/>
+              </a:ext>
+            </a:extLst>
+          </a:blip>
+          <a:stretch>
+            <a:fillRect/>
+          </a:stretch>
+        </p:blipFill>
+        <p:spPr>
+          <a:xfrm>
+            <a:off x="7086600" y="249228"/>
+            <a:ext cx="1625397" cy="1625397"/>
+          </a:xfrm>
+          <a:prstGeom prst="rect">
+            <a:avLst/>
+          </a:prstGeom>
+        </p:spPr>
+      </p:pic>
+    </p:spTree>
+    <p:extLst>
+      <p:ext uri="{BB962C8B-B14F-4D97-AF65-F5344CB8AC3E}">
+        <p14:creationId xmlns:p14="http://schemas.microsoft.com/office/powerpoint/2010/main" val="3081305806"/>
       </p:ext>
     </p:extLst>
   </p:cSld>

</xml_diff>